<commit_message>
grounded simulation on real GDP data
</commit_message>
<xml_diff>
--- a/Documents/SC_pitch.pptx
+++ b/Documents/SC_pitch.pptx
@@ -5,10 +5,10 @@
     <p:sldMasterId id="2147483679" r:id="rId4"/>
   </p:sldMasterIdLst>
   <p:notesMasterIdLst>
-    <p:notesMasterId r:id="rId24"/>
+    <p:notesMasterId r:id="rId25"/>
   </p:notesMasterIdLst>
   <p:handoutMasterIdLst>
-    <p:handoutMasterId r:id="rId25"/>
+    <p:handoutMasterId r:id="rId26"/>
   </p:handoutMasterIdLst>
   <p:sldIdLst>
     <p:sldId id="262" r:id="rId5"/>
@@ -30,6 +30,7 @@
     <p:sldId id="280" r:id="rId21"/>
     <p:sldId id="288" r:id="rId22"/>
     <p:sldId id="287" r:id="rId23"/>
+    <p:sldId id="289" r:id="rId24"/>
   </p:sldIdLst>
   <p:sldSz cx="12192000" cy="6858000"/>
   <p:notesSz cx="6858000" cy="9144000"/>
@@ -233,7 +234,7 @@
           <a:p>
             <a:fld id="{0D0BC2D3-C2A7-47C3-90FD-EBB22447478D}" type="datetimeFigureOut">
               <a:rPr lang="de-DE" smtClean="0"/>
-              <a:t>12.01.2023</a:t>
+              <a:t>13.01.2023</a:t>
             </a:fld>
             <a:endParaRPr lang="de-DE"/>
           </a:p>
@@ -451,7 +452,7 @@
           <a:p>
             <a:fld id="{6C0C46B0-EFD9-4439-A7DD-5A6E3D3A8873}" type="datetimeFigureOut">
               <a:rPr lang="de-DE" smtClean="0"/>
-              <a:t>12.01.2023</a:t>
+              <a:t>13.01.2023</a:t>
             </a:fld>
             <a:endParaRPr lang="de-DE"/>
           </a:p>
@@ -10183,7 +10184,7 @@
           <a:bodyPr/>
           <a:lstStyle/>
           <a:p>
-            <a:endParaRPr lang="en-US"/>
+            <a:endParaRPr lang="en-US" dirty="0"/>
           </a:p>
         </p:txBody>
       </p:sp>
@@ -10553,10 +10554,10 @@
           <a:lstStyle/>
           <a:p>
             <a:r>
-              <a:rPr lang="en-US"/>
+              <a:rPr lang="en-US" dirty="0"/>
               <a:t>Assessing the Limits of SC</a:t>
             </a:r>
-            <a:endParaRPr lang="de-DE"/>
+            <a:endParaRPr lang="de-DE" dirty="0"/>
           </a:p>
         </p:txBody>
       </p:sp>
@@ -10845,7 +10846,7 @@
             </a:r>
             <a:r>
               <a:rPr lang="en-US" sz="1400" dirty="0"/>
-              <a:t>, Hanh and Chi (2017)</a:t>
+              <a:t>, Hahn and Chi (2017)</a:t>
             </a:r>
             <a:br>
               <a:rPr lang="en-US" sz="1400" dirty="0"/>
@@ -11245,9 +11246,6 @@
           <a:p>
             <a:endParaRPr lang="de-DE" dirty="0"/>
           </a:p>
-          <a:p>
-            <a:endParaRPr lang="de-DE" dirty="0"/>
-          </a:p>
         </p:txBody>
       </p:sp>
       <p:sp>
@@ -11575,6 +11573,217 @@
     <p:extLst>
       <p:ext uri="{BB962C8B-B14F-4D97-AF65-F5344CB8AC3E}">
         <p14:creationId xmlns:p14="http://schemas.microsoft.com/office/powerpoint/2010/main" val="325819446"/>
+      </p:ext>
+    </p:extLst>
+  </p:cSld>
+  <p:clrMapOvr>
+    <a:masterClrMapping/>
+  </p:clrMapOvr>
+</p:sld>
+</file>
+
+<file path=ppt/slides/slide20.xml><?xml version="1.0" encoding="utf-8"?>
+<p:sld xmlns:a="http://schemas.openxmlformats.org/drawingml/2006/main" xmlns:r="http://schemas.openxmlformats.org/officeDocument/2006/relationships" xmlns:p="http://schemas.openxmlformats.org/presentationml/2006/main">
+  <p:cSld>
+    <p:spTree>
+      <p:nvGrpSpPr>
+        <p:cNvPr id="1" name=""/>
+        <p:cNvGrpSpPr/>
+        <p:nvPr/>
+      </p:nvGrpSpPr>
+      <p:grpSpPr>
+        <a:xfrm>
+          <a:off x="0" y="0"/>
+          <a:ext cx="0" cy="0"/>
+          <a:chOff x="0" y="0"/>
+          <a:chExt cx="0" cy="0"/>
+        </a:xfrm>
+      </p:grpSpPr>
+      <p:sp>
+        <p:nvSpPr>
+          <p:cNvPr id="2" name="Fußzeilenplatzhalter 1">
+            <a:extLst>
+              <a:ext uri="{FF2B5EF4-FFF2-40B4-BE49-F238E27FC236}">
+                <a16:creationId xmlns:a16="http://schemas.microsoft.com/office/drawing/2014/main" id="{4986C051-5F69-36ED-C8D4-75C9264BEC6E}"/>
+              </a:ext>
+            </a:extLst>
+          </p:cNvPr>
+          <p:cNvSpPr>
+            <a:spLocks noGrp="1"/>
+          </p:cNvSpPr>
+          <p:nvPr>
+            <p:ph type="ftr" sz="quarter" idx="18"/>
+          </p:nvPr>
+        </p:nvSpPr>
+        <p:spPr/>
+        <p:txBody>
+          <a:bodyPr/>
+          <a:lstStyle/>
+          <a:p>
+            <a:r>
+              <a:rPr lang="en-US"/>
+              <a:t>Assessing the Limits of SC</a:t>
+            </a:r>
+            <a:endParaRPr lang="de-DE"/>
+          </a:p>
+        </p:txBody>
+      </p:sp>
+      <p:sp>
+        <p:nvSpPr>
+          <p:cNvPr id="3" name="Textplatzhalter 2">
+            <a:extLst>
+              <a:ext uri="{FF2B5EF4-FFF2-40B4-BE49-F238E27FC236}">
+                <a16:creationId xmlns:a16="http://schemas.microsoft.com/office/drawing/2014/main" id="{B5ABF54A-54C3-B40B-BE61-275B6DEF4AE2}"/>
+              </a:ext>
+            </a:extLst>
+          </p:cNvPr>
+          <p:cNvSpPr>
+            <a:spLocks noGrp="1"/>
+          </p:cNvSpPr>
+          <p:nvPr>
+            <p:ph type="body" sz="quarter" idx="17"/>
+          </p:nvPr>
+        </p:nvSpPr>
+        <p:spPr/>
+        <p:txBody>
+          <a:bodyPr/>
+          <a:lstStyle/>
+          <a:p>
+            <a:endParaRPr lang="de-DE"/>
+          </a:p>
+        </p:txBody>
+      </p:sp>
+      <p:sp>
+        <p:nvSpPr>
+          <p:cNvPr id="4" name="Inhaltsplatzhalter 3">
+            <a:extLst>
+              <a:ext uri="{FF2B5EF4-FFF2-40B4-BE49-F238E27FC236}">
+                <a16:creationId xmlns:a16="http://schemas.microsoft.com/office/drawing/2014/main" id="{82BC5C88-BD00-02BC-0574-34B90AF2AD2F}"/>
+              </a:ext>
+            </a:extLst>
+          </p:cNvPr>
+          <p:cNvSpPr>
+            <a:spLocks noGrp="1"/>
+          </p:cNvSpPr>
+          <p:nvPr>
+            <p:ph idx="1"/>
+          </p:nvPr>
+        </p:nvSpPr>
+        <p:spPr>
+          <a:xfrm>
+            <a:off x="702000" y="1396050"/>
+            <a:ext cx="10801350" cy="4468256"/>
+          </a:xfrm>
+        </p:spPr>
+        <p:txBody>
+          <a:bodyPr/>
+          <a:lstStyle/>
+          <a:p>
+            <a:pPr marL="342900" indent="-342900">
+              <a:buFont typeface="Wingdings" panose="05000000000000000000" pitchFamily="2" charset="2"/>
+              <a:buChar char="§"/>
+            </a:pPr>
+            <a:r>
+              <a:rPr lang="de-DE" dirty="0"/>
+              <a:t>Simulation konzeptionell in Ordnung?</a:t>
+            </a:r>
+          </a:p>
+          <a:p>
+            <a:pPr marL="342900" indent="-342900">
+              <a:buFont typeface="Wingdings" panose="05000000000000000000" pitchFamily="2" charset="2"/>
+              <a:buChar char="§"/>
+            </a:pPr>
+            <a:r>
+              <a:rPr lang="de-DE" dirty="0"/>
+              <a:t>Weitere zu betrachtende Aspekte?</a:t>
+            </a:r>
+          </a:p>
+          <a:p>
+            <a:pPr marL="342900" indent="-342900">
+              <a:buFont typeface="Wingdings" panose="05000000000000000000" pitchFamily="2" charset="2"/>
+              <a:buChar char="§"/>
+            </a:pPr>
+            <a:r>
+              <a:rPr lang="de-DE" dirty="0"/>
+              <a:t>Struktur grundsätzlich ok?</a:t>
+            </a:r>
+          </a:p>
+          <a:p>
+            <a:pPr marL="342900" indent="-342900">
+              <a:buFont typeface="Wingdings" panose="05000000000000000000" pitchFamily="2" charset="2"/>
+              <a:buChar char="§"/>
+            </a:pPr>
+            <a:r>
+              <a:rPr lang="de-DE" dirty="0"/>
+              <a:t>Organisation: Zeitschiene, Veröffentlichung</a:t>
+            </a:r>
+          </a:p>
+          <a:p>
+            <a:pPr marL="342900" indent="-342900">
+              <a:buFont typeface="Wingdings" panose="05000000000000000000" pitchFamily="2" charset="2"/>
+              <a:buChar char="§"/>
+            </a:pPr>
+            <a:endParaRPr lang="de-DE" dirty="0"/>
+          </a:p>
+        </p:txBody>
+      </p:sp>
+      <p:sp>
+        <p:nvSpPr>
+          <p:cNvPr id="5" name="Textplatzhalter 4">
+            <a:extLst>
+              <a:ext uri="{FF2B5EF4-FFF2-40B4-BE49-F238E27FC236}">
+                <a16:creationId xmlns:a16="http://schemas.microsoft.com/office/drawing/2014/main" id="{08D2222E-A31D-DF1D-F9E2-3D33D7B048AD}"/>
+              </a:ext>
+            </a:extLst>
+          </p:cNvPr>
+          <p:cNvSpPr>
+            <a:spLocks noGrp="1"/>
+          </p:cNvSpPr>
+          <p:nvPr>
+            <p:ph type="body" sz="quarter" idx="13"/>
+          </p:nvPr>
+        </p:nvSpPr>
+        <p:spPr/>
+        <p:txBody>
+          <a:bodyPr/>
+          <a:lstStyle/>
+          <a:p>
+            <a:endParaRPr lang="de-DE"/>
+          </a:p>
+        </p:txBody>
+      </p:sp>
+      <p:sp>
+        <p:nvSpPr>
+          <p:cNvPr id="6" name="Titel 5">
+            <a:extLst>
+              <a:ext uri="{FF2B5EF4-FFF2-40B4-BE49-F238E27FC236}">
+                <a16:creationId xmlns:a16="http://schemas.microsoft.com/office/drawing/2014/main" id="{9728AF9F-B597-7E13-5741-2C39A017F99F}"/>
+              </a:ext>
+            </a:extLst>
+          </p:cNvPr>
+          <p:cNvSpPr>
+            <a:spLocks noGrp="1"/>
+          </p:cNvSpPr>
+          <p:nvPr>
+            <p:ph type="title"/>
+          </p:nvPr>
+        </p:nvSpPr>
+        <p:spPr/>
+        <p:txBody>
+          <a:bodyPr/>
+          <a:lstStyle/>
+          <a:p>
+            <a:r>
+              <a:rPr lang="de-DE" dirty="0"/>
+              <a:t>Offene Punkte</a:t>
+            </a:r>
+          </a:p>
+        </p:txBody>
+      </p:sp>
+    </p:spTree>
+    <p:extLst>
+      <p:ext uri="{BB962C8B-B14F-4D97-AF65-F5344CB8AC3E}">
+        <p14:creationId xmlns:p14="http://schemas.microsoft.com/office/powerpoint/2010/main" val="1961087308"/>
       </p:ext>
     </p:extLst>
   </p:cSld>
@@ -15090,6 +15299,15 @@
 </file>
 
 <file path=customXml/item2.xml><?xml version="1.0" encoding="utf-8"?>
+<?mso-contentType ?>
+<FormTemplates xmlns="http://schemas.microsoft.com/sharepoint/v3/contenttype/forms">
+  <Display>DocumentLibraryForm</Display>
+  <Edit>DocumentLibraryForm</Edit>
+  <New>DocumentLibraryForm</New>
+</FormTemplates>
+</file>
+
+<file path=customXml/item3.xml><?xml version="1.0" encoding="utf-8"?>
 <ct:contentTypeSchema xmlns:ct="http://schemas.microsoft.com/office/2006/metadata/contentType" xmlns:ma="http://schemas.microsoft.com/office/2006/metadata/properties/metaAttributes" ct:_="" ma:_="" ma:contentTypeName="Dokument" ma:contentTypeID="0x0101002FF7506D977129418A772DE869B28F2E" ma:contentTypeVersion="11" ma:contentTypeDescription="Ein neues Dokument erstellen." ma:contentTypeScope="" ma:versionID="5f6de3ba704a20f95f90a897c1cd7b2e">
   <xsd:schema xmlns:xsd="http://www.w3.org/2001/XMLSchema" xmlns:xs="http://www.w3.org/2001/XMLSchema" xmlns:p="http://schemas.microsoft.com/office/2006/metadata/properties" xmlns:ns2="6c576d71-64c4-4bed-841f-698835626de1" xmlns:ns3="0341f4de-d7da-49aa-9e39-6e943a5fa446" targetNamespace="http://schemas.microsoft.com/office/2006/metadata/properties" ma:root="true" ma:fieldsID="5a4ae21eb4db48f885647756da8bdc98" ns2:_="" ns3:_="">
     <xsd:import namespace="6c576d71-64c4-4bed-841f-698835626de1"/>
@@ -15300,15 +15518,6 @@
 </ct:contentTypeSchema>
 </file>
 
-<file path=customXml/item3.xml><?xml version="1.0" encoding="utf-8"?>
-<?mso-contentType ?>
-<FormTemplates xmlns="http://schemas.microsoft.com/sharepoint/v3/contenttype/forms">
-  <Display>DocumentLibraryForm</Display>
-  <Edit>DocumentLibraryForm</Edit>
-  <New>DocumentLibraryForm</New>
-</FormTemplates>
-</file>
-
 <file path=customXml/itemProps1.xml><?xml version="1.0" encoding="utf-8"?>
 <ds:datastoreItem xmlns:ds="http://schemas.openxmlformats.org/officeDocument/2006/customXml" ds:itemID="{25AF45CA-A69C-42EF-A6CC-1DA68205A3E3}">
   <ds:schemaRefs>
@@ -15327,6 +15536,14 @@
 </file>
 
 <file path=customXml/itemProps2.xml><?xml version="1.0" encoding="utf-8"?>
+<ds:datastoreItem xmlns:ds="http://schemas.openxmlformats.org/officeDocument/2006/customXml" ds:itemID="{E95A2C07-82C6-4BA4-8E4F-7A2B28903BDC}">
+  <ds:schemaRefs>
+    <ds:schemaRef ds:uri="http://schemas.microsoft.com/sharepoint/v3/contenttype/forms"/>
+  </ds:schemaRefs>
+</ds:datastoreItem>
+</file>
+
+<file path=customXml/itemProps3.xml><?xml version="1.0" encoding="utf-8"?>
 <ds:datastoreItem xmlns:ds="http://schemas.openxmlformats.org/officeDocument/2006/customXml" ds:itemID="{5E406275-C4C1-4C1C-BF52-B3A568E1E425}">
   <ds:schemaRefs>
     <ds:schemaRef ds:uri="http://schemas.microsoft.com/office/2006/metadata/contentType"/>
@@ -15343,12 +15560,4 @@
     <ds:schemaRef ds:uri="http://schemas.microsoft.com/internal/obd"/>
   </ds:schemaRefs>
 </ds:datastoreItem>
-</file>
-
-<file path=customXml/itemProps3.xml><?xml version="1.0" encoding="utf-8"?>
-<ds:datastoreItem xmlns:ds="http://schemas.openxmlformats.org/officeDocument/2006/customXml" ds:itemID="{E95A2C07-82C6-4BA4-8E4F-7A2B28903BDC}">
-  <ds:schemaRefs>
-    <ds:schemaRef ds:uri="http://schemas.microsoft.com/sharepoint/v3/contenttype/forms"/>
-  </ds:schemaRefs>
-</ds:datastoreItem>
 </file>
</xml_diff>